<commit_message>
Sync commit. Successfully used new dlc_csv_to_struct, todo run wls and verify.
</commit_message>
<xml_diff>
--- a/PIPELINE/OUTPUT/weighted_least_squares/Weighted_Least_Squares.pptx
+++ b/PIPELINE/OUTPUT/weighted_least_squares/Weighted_Least_Squares.pptx
@@ -243,7 +243,7 @@
           <a:p>
             <a:fld id="{579C439E-8EF2-3F4B-88D4-5AEF9FA194D5}" type="datetimeFigureOut">
               <a:rPr lang="en-US" smtClean="0"/>
-              <a:t>7/10/24</a:t>
+              <a:t>7/24/24</a:t>
             </a:fld>
             <a:endParaRPr lang="en-US"/>
           </a:p>
@@ -823,7 +823,7 @@
           <a:p>
             <a:fld id="{1D8BD707-D9CF-40AE-B4C6-C98DA3205C09}" type="datetimeFigureOut">
               <a:rPr lang="en-US"/>
-              <a:t>7/10/24</a:t>
+              <a:t>7/24/24</a:t>
             </a:fld>
             <a:endParaRPr lang="en-US"/>
           </a:p>
@@ -994,7 +994,7 @@
           <a:p>
             <a:fld id="{1D8BD707-D9CF-40AE-B4C6-C98DA3205C09}" type="datetimeFigureOut">
               <a:rPr lang="en-US"/>
-              <a:t>7/10/24</a:t>
+              <a:t>7/24/24</a:t>
             </a:fld>
             <a:endParaRPr lang="en-US"/>
           </a:p>
@@ -1208,7 +1208,7 @@
           <a:p>
             <a:fld id="{1D8BD707-D9CF-40AE-B4C6-C98DA3205C09}" type="datetimeFigureOut">
               <a:rPr lang="en-US"/>
-              <a:t>7/10/24</a:t>
+              <a:t>7/24/24</a:t>
             </a:fld>
             <a:endParaRPr lang="en-US"/>
           </a:p>
@@ -1414,7 +1414,7 @@
           <a:p>
             <a:fld id="{1D8BD707-D9CF-40AE-B4C6-C98DA3205C09}" type="datetimeFigureOut">
               <a:rPr lang="en-US"/>
-              <a:t>7/10/24</a:t>
+              <a:t>7/24/24</a:t>
             </a:fld>
             <a:endParaRPr lang="en-US"/>
           </a:p>
@@ -1533,7 +1533,7 @@
           <a:p>
             <a:fld id="{1D8BD707-D9CF-40AE-B4C6-C98DA3205C09}" type="datetimeFigureOut">
               <a:rPr lang="en-US"/>
-              <a:t>7/10/24</a:t>
+              <a:t>7/24/24</a:t>
             </a:fld>
             <a:endParaRPr lang="en-US"/>
           </a:p>
@@ -1752,7 +1752,7 @@
           <a:p>
             <a:fld id="{1D8BD707-D9CF-40AE-B4C6-C98DA3205C09}" type="datetimeFigureOut">
               <a:rPr lang="en-US"/>
-              <a:t>7/10/24</a:t>
+              <a:t>7/24/24</a:t>
             </a:fld>
             <a:endParaRPr lang="en-US"/>
           </a:p>
@@ -11579,7 +11579,7 @@
         </p:blipFill>
         <p:spPr>
           <a:xfrm>
-            <a:off x="5175250" y="1675437"/>
+            <a:off x="2889250" y="2107769"/>
             <a:ext cx="9753600" cy="8475038"/>
           </a:xfrm>
           <a:prstGeom prst="rect">

</xml_diff>